<commit_message>
added posix results to presentation, little fix on tree restoring
</commit_message>
<xml_diff>
--- a/diploma v0.3.pptx
+++ b/diploma v0.3.pptx
@@ -3755,11 +3755,7 @@
             </a:r>
             <a:r>
               <a:rPr lang="ru-RU" smtClean="0"/>
-              <a:t>заголовков </a:t>
-            </a:r>
-            <a:r>
-              <a:rPr lang="ru-RU" smtClean="0"/>
-              <a:t>разделов</a:t>
+              <a:t>заголовков разделов</a:t>
             </a:r>
             <a:r>
               <a:rPr lang="ru-RU" dirty="0" smtClean="0"/>
@@ -4651,7 +4647,12 @@
             <p:ph type="title"/>
           </p:nvPr>
         </p:nvSpPr>
-        <p:spPr/>
+        <p:spPr>
+          <a:xfrm>
+            <a:off x="467544" y="25121"/>
+            <a:ext cx="8229600" cy="883599"/>
+          </a:xfrm>
+        </p:spPr>
         <p:txBody>
           <a:bodyPr/>
           <a:lstStyle/>
@@ -4660,44 +4661,6 @@
               <a:rPr lang="ru-RU" dirty="0" smtClean="0"/>
               <a:t>Результаты экспериментов</a:t>
             </a:r>
-            <a:endParaRPr lang="ru-RU" dirty="0"/>
-          </a:p>
-        </p:txBody>
-      </p:sp>
-      <p:sp>
-        <p:nvSpPr>
-          <p:cNvPr id="3" name="Объект 2"/>
-          <p:cNvSpPr>
-            <a:spLocks noGrp="1"/>
-          </p:cNvSpPr>
-          <p:nvPr>
-            <p:ph idx="1"/>
-          </p:nvPr>
-        </p:nvSpPr>
-        <p:spPr>
-          <a:xfrm>
-            <a:off x="457200" y="1600201"/>
-            <a:ext cx="8229600" cy="1036712"/>
-          </a:xfrm>
-        </p:spPr>
-        <p:txBody>
-          <a:bodyPr>
-            <a:normAutofit lnSpcReduction="10000"/>
-          </a:bodyPr>
-          <a:lstStyle/>
-          <a:p>
-            <a:pPr marL="0" indent="0">
-              <a:buNone/>
-            </a:pPr>
-            <a:r>
-              <a:rPr lang="ru-RU" dirty="0" smtClean="0"/>
-              <a:t>Алгоритм был протестирован на следующих документах:</a:t>
-            </a:r>
-          </a:p>
-          <a:p>
-            <a:pPr marL="0" indent="0">
-              <a:buNone/>
-            </a:pPr>
             <a:endParaRPr lang="ru-RU" dirty="0"/>
           </a:p>
         </p:txBody>
@@ -4711,14 +4674,14 @@
           <p:nvPr>
             <p:extLst>
               <p:ext uri="{D42A27DB-BD31-4B8C-83A1-F6EECF244321}">
-                <p14:modId xmlns:p14="http://schemas.microsoft.com/office/powerpoint/2010/main" val="1764557451"/>
+                <p14:modId xmlns:p14="http://schemas.microsoft.com/office/powerpoint/2010/main" val="2995251627"/>
               </p:ext>
             </p:extLst>
           </p:nvPr>
         </p:nvGraphicFramePr>
         <p:xfrm>
-          <a:off x="323528" y="2636913"/>
-          <a:ext cx="7920880" cy="3779520"/>
+          <a:off x="107504" y="836712"/>
+          <a:ext cx="8352928" cy="5699760"/>
         </p:xfrm>
         <a:graphic>
           <a:graphicData uri="http://schemas.openxmlformats.org/drawingml/2006/table">
@@ -4727,13 +4690,13 @@
                 <a:tableStyleId>{5C22544A-7EE6-4342-B048-85BDC9FD1C3A}</a:tableStyleId>
               </a:tblPr>
               <a:tblGrid>
-                <a:gridCol w="1982638"/>
-                <a:gridCol w="1610893"/>
-                <a:gridCol w="1611499"/>
-                <a:gridCol w="2106552"/>
-                <a:gridCol w="609298"/>
+                <a:gridCol w="2090782"/>
+                <a:gridCol w="1539112"/>
+                <a:gridCol w="1903312"/>
+                <a:gridCol w="2255778"/>
+                <a:gridCol w="563944"/>
               </a:tblGrid>
-              <a:tr h="804039">
+              <a:tr h="303123">
                 <a:tc>
                   <a:txBody>
                     <a:bodyPr/>
@@ -4768,14 +4731,26 @@
                     <a:lstStyle/>
                     <a:p>
                       <a:r>
-                        <a:rPr lang="ru-RU" dirty="0" smtClean="0"/>
+                        <a:rPr lang="ru-RU" sz="1600" dirty="0" smtClean="0"/>
                         <a:t>Примерный</a:t>
                       </a:r>
                       <a:r>
-                        <a:rPr lang="ru-RU" baseline="0" dirty="0" smtClean="0"/>
-                        <a:t> объем (тыс. символов)</a:t>
-                      </a:r>
-                      <a:endParaRPr lang="ru-RU" dirty="0"/>
+                        <a:rPr lang="ru-RU" sz="1600" baseline="0" dirty="0" smtClean="0"/>
+                        <a:t> объем (</a:t>
+                      </a:r>
+                      <a:r>
+                        <a:rPr lang="ru-RU" sz="1600" baseline="0" dirty="0" err="1" smtClean="0"/>
+                        <a:t>тыс</a:t>
+                      </a:r>
+                      <a:r>
+                        <a:rPr lang="en-US" sz="1600" baseline="0" dirty="0" smtClean="0"/>
+                        <a:t>. </a:t>
+                      </a:r>
+                      <a:r>
+                        <a:rPr lang="ru-RU" sz="1600" baseline="0" dirty="0" smtClean="0"/>
+                        <a:t>символов)</a:t>
+                      </a:r>
+                      <a:endParaRPr lang="ru-RU" sz="1600" dirty="0"/>
                     </a:p>
                   </a:txBody>
                   <a:tcPr/>
@@ -4786,10 +4761,10 @@
                     <a:lstStyle/>
                     <a:p>
                       <a:r>
-                        <a:rPr lang="ru-RU" dirty="0" smtClean="0"/>
+                        <a:rPr lang="ru-RU" sz="1600" dirty="0" smtClean="0"/>
                         <a:t>Количество найденных фрагментов</a:t>
                       </a:r>
-                      <a:endParaRPr lang="ru-RU" dirty="0"/>
+                      <a:endParaRPr lang="ru-RU" sz="1600" dirty="0"/>
                     </a:p>
                   </a:txBody>
                   <a:tcPr/>
@@ -4810,7 +4785,7 @@
                   <a:tcPr/>
                 </a:tc>
               </a:tr>
-              <a:tr h="321616">
+              <a:tr h="175492">
                 <a:tc>
                   <a:txBody>
                     <a:bodyPr/>
@@ -4839,7 +4814,11 @@
                     <a:p>
                       <a:r>
                         <a:rPr lang="en-US" sz="1600" dirty="0" smtClean="0"/>
-                        <a:t>V1.1.12 – V1.1.14</a:t>
+                        <a:t>V1.1.12 – </a:t>
+                      </a:r>
+                      <a:r>
+                        <a:rPr lang="en-US" sz="1600" dirty="0" smtClean="0"/>
+                        <a:t>1.1.14</a:t>
                       </a:r>
                       <a:endParaRPr lang="ru-RU" sz="1600" dirty="0"/>
                     </a:p>
@@ -4866,38 +4845,8 @@
                     <a:lstStyle/>
                     <a:p>
                       <a:r>
-                        <a:rPr lang="ru-RU" dirty="0" smtClean="0"/>
+                        <a:rPr lang="ru-RU" sz="1600" dirty="0" smtClean="0"/>
                         <a:t>101/102</a:t>
-                      </a:r>
-                      <a:endParaRPr lang="ru-RU" dirty="0"/>
-                    </a:p>
-                  </a:txBody>
-                  <a:tcPr/>
-                </a:tc>
-                <a:tc>
-                  <a:txBody>
-                    <a:bodyPr/>
-                    <a:lstStyle/>
-                    <a:p>
-                      <a:r>
-                        <a:rPr lang="ru-RU" dirty="0" smtClean="0"/>
-                        <a:t>99</a:t>
-                      </a:r>
-                      <a:endParaRPr lang="ru-RU" dirty="0"/>
-                    </a:p>
-                  </a:txBody>
-                  <a:tcPr/>
-                </a:tc>
-              </a:tr>
-              <a:tr h="562828">
-                <a:tc>
-                  <a:txBody>
-                    <a:bodyPr/>
-                    <a:lstStyle/>
-                    <a:p>
-                      <a:r>
-                        <a:rPr lang="en-US" sz="1600" dirty="0" smtClean="0"/>
-                        <a:t>TTCN-3 core language part 3 head 5</a:t>
                       </a:r>
                       <a:endParaRPr lang="ru-RU" sz="1600" dirty="0"/>
                     </a:p>
@@ -4910,16 +4859,24 @@
                     <a:lstStyle/>
                     <a:p>
                       <a:r>
+                        <a:rPr lang="ru-RU" sz="1600" dirty="0" smtClean="0"/>
+                        <a:t>99</a:t>
+                      </a:r>
+                      <a:endParaRPr lang="ru-RU" sz="1600" dirty="0"/>
+                    </a:p>
+                  </a:txBody>
+                  <a:tcPr/>
+                </a:tc>
+              </a:tr>
+              <a:tr h="303123">
+                <a:tc>
+                  <a:txBody>
+                    <a:bodyPr/>
+                    <a:lstStyle/>
+                    <a:p>
+                      <a:r>
                         <a:rPr lang="en-US" sz="1600" dirty="0" smtClean="0"/>
-                        <a:t>V4.5.1 – V4.6.1</a:t>
-                      </a:r>
-                      <a:r>
-                        <a:rPr lang="en-US" sz="1600" baseline="0" dirty="0" smtClean="0"/>
-                        <a:t> </a:t>
-                      </a:r>
-                      <a:r>
-                        <a:rPr lang="en-US" sz="1600" dirty="0" smtClean="0"/>
-                        <a:t> </a:t>
+                        <a:t>TTCN-3 core language part 3 head 5</a:t>
                       </a:r>
                       <a:endParaRPr lang="ru-RU" sz="1600" dirty="0"/>
                     </a:p>
@@ -4932,8 +4889,20 @@
                     <a:lstStyle/>
                     <a:p>
                       <a:r>
-                        <a:rPr lang="ru-RU" sz="1600" dirty="0" smtClean="0"/>
-                        <a:t>32</a:t>
+                        <a:rPr lang="en-US" sz="1600" dirty="0" smtClean="0"/>
+                        <a:t>V4.5.1 – </a:t>
+                      </a:r>
+                      <a:r>
+                        <a:rPr lang="en-US" sz="1600" dirty="0" smtClean="0"/>
+                        <a:t>4.6.1</a:t>
+                      </a:r>
+                      <a:r>
+                        <a:rPr lang="en-US" sz="1600" baseline="0" dirty="0" smtClean="0"/>
+                        <a:t> </a:t>
+                      </a:r>
+                      <a:r>
+                        <a:rPr lang="en-US" sz="1600" dirty="0" smtClean="0"/>
+                        <a:t> </a:t>
                       </a:r>
                       <a:endParaRPr lang="ru-RU" sz="1600" dirty="0"/>
                     </a:p>
@@ -4946,10 +4915,10 @@
                     <a:lstStyle/>
                     <a:p>
                       <a:r>
-                        <a:rPr lang="ru-RU" dirty="0" smtClean="0"/>
-                        <a:t>169/172</a:t>
-                      </a:r>
-                      <a:endParaRPr lang="ru-RU" dirty="0"/>
+                        <a:rPr lang="ru-RU" sz="1600" dirty="0" smtClean="0"/>
+                        <a:t>32</a:t>
+                      </a:r>
+                      <a:endParaRPr lang="ru-RU" sz="1600" dirty="0"/>
                     </a:p>
                   </a:txBody>
                   <a:tcPr/>
@@ -4960,16 +4929,30 @@
                     <a:lstStyle/>
                     <a:p>
                       <a:r>
-                        <a:rPr lang="ru-RU" dirty="0" smtClean="0"/>
+                        <a:rPr lang="ru-RU" sz="1600" dirty="0" smtClean="0"/>
+                        <a:t>169/172</a:t>
+                      </a:r>
+                      <a:endParaRPr lang="ru-RU" sz="1600" dirty="0"/>
+                    </a:p>
+                  </a:txBody>
+                  <a:tcPr/>
+                </a:tc>
+                <a:tc>
+                  <a:txBody>
+                    <a:bodyPr/>
+                    <a:lstStyle/>
+                    <a:p>
+                      <a:r>
+                        <a:rPr lang="ru-RU" sz="1600" dirty="0" smtClean="0"/>
                         <a:t>98</a:t>
                       </a:r>
-                      <a:endParaRPr lang="ru-RU" dirty="0"/>
+                      <a:endParaRPr lang="ru-RU" sz="1600" dirty="0"/>
                     </a:p>
                   </a:txBody>
                   <a:tcPr/>
                 </a:tc>
               </a:tr>
-              <a:tr h="804039">
+              <a:tr h="446708">
                 <a:tc>
                   <a:txBody>
                     <a:bodyPr/>
@@ -4994,12 +4977,13 @@
                       </a:pPr>
                       <a:r>
                         <a:rPr lang="en-US" sz="1600" dirty="0" smtClean="0"/>
-                        <a:t>TTCN-3 core language part 4 head 6</a:t>
+                        <a:t>TTCN-3 core language part 4 head </a:t>
+                      </a:r>
+                      <a:r>
+                        <a:rPr lang="en-US" sz="1600" dirty="0" smtClean="0"/>
+                        <a:t>6</a:t>
                       </a:r>
                       <a:endParaRPr lang="ru-RU" sz="1600" dirty="0" smtClean="0"/>
-                    </a:p>
-                    <a:p>
-                      <a:endParaRPr lang="ru-RU" dirty="0"/>
                     </a:p>
                   </a:txBody>
                   <a:tcPr/>
@@ -5028,7 +5012,11 @@
                       </a:pPr>
                       <a:r>
                         <a:rPr lang="en-US" sz="1600" dirty="0" smtClean="0"/>
-                        <a:t>V4.5.1 – V4.6.1</a:t>
+                        <a:t>V4.5.1 – </a:t>
+                      </a:r>
+                      <a:r>
+                        <a:rPr lang="en-US" sz="1600" dirty="0" smtClean="0"/>
+                        <a:t>4.6.1</a:t>
                       </a:r>
                       <a:r>
                         <a:rPr lang="en-US" sz="1600" baseline="0" dirty="0" smtClean="0"/>
@@ -5066,10 +5054,10 @@
                     <a:lstStyle/>
                     <a:p>
                       <a:r>
-                        <a:rPr lang="ru-RU" dirty="0" smtClean="0"/>
+                        <a:rPr lang="ru-RU" sz="1600" dirty="0" smtClean="0"/>
                         <a:t>495/510</a:t>
                       </a:r>
-                      <a:endParaRPr lang="ru-RU" dirty="0"/>
+                      <a:endParaRPr lang="ru-RU" sz="1600" dirty="0"/>
                     </a:p>
                   </a:txBody>
                   <a:tcPr/>
@@ -5080,16 +5068,16 @@
                     <a:lstStyle/>
                     <a:p>
                       <a:r>
-                        <a:rPr lang="ru-RU" dirty="0" smtClean="0"/>
+                        <a:rPr lang="ru-RU" sz="1600" dirty="0" smtClean="0"/>
                         <a:t>97</a:t>
                       </a:r>
-                      <a:endParaRPr lang="ru-RU" dirty="0"/>
+                      <a:endParaRPr lang="ru-RU" sz="1600" dirty="0"/>
                     </a:p>
                   </a:txBody>
                   <a:tcPr/>
                 </a:tc>
               </a:tr>
-              <a:tr h="804039">
+              <a:tr h="533359">
                 <a:tc>
                   <a:txBody>
                     <a:bodyPr/>
@@ -5114,12 +5102,13 @@
                       </a:pPr>
                       <a:r>
                         <a:rPr lang="en-US" sz="1600" dirty="0" smtClean="0"/>
-                        <a:t>TTCN-3 core language part 5 head 7</a:t>
+                        <a:t>TTCN-3 core language part 5 head </a:t>
+                      </a:r>
+                      <a:r>
+                        <a:rPr lang="en-US" sz="1600" dirty="0" smtClean="0"/>
+                        <a:t>7</a:t>
                       </a:r>
                       <a:endParaRPr lang="ru-RU" sz="1600" dirty="0" smtClean="0"/>
-                    </a:p>
-                    <a:p>
-                      <a:endParaRPr lang="ru-RU" dirty="0"/>
                     </a:p>
                   </a:txBody>
                   <a:tcPr/>
@@ -5148,7 +5137,11 @@
                       </a:pPr>
                       <a:r>
                         <a:rPr lang="en-US" sz="1600" dirty="0" smtClean="0"/>
-                        <a:t>V4.5.1 – V4.6.1</a:t>
+                        <a:t>V4.5.1 – </a:t>
+                      </a:r>
+                      <a:r>
+                        <a:rPr lang="en-US" sz="1600" dirty="0" smtClean="0"/>
+                        <a:t>4.6.1</a:t>
                       </a:r>
                       <a:r>
                         <a:rPr lang="en-US" sz="1600" baseline="0" dirty="0" smtClean="0"/>
@@ -5186,10 +5179,10 @@
                     <a:lstStyle/>
                     <a:p>
                       <a:r>
-                        <a:rPr lang="ru-RU" dirty="0" smtClean="0"/>
+                        <a:rPr lang="ru-RU" sz="1600" dirty="0" smtClean="0"/>
                         <a:t>72/76</a:t>
                       </a:r>
-                      <a:endParaRPr lang="ru-RU" dirty="0"/>
+                      <a:endParaRPr lang="ru-RU" sz="1600" dirty="0"/>
                     </a:p>
                   </a:txBody>
                   <a:tcPr/>
@@ -5200,10 +5193,641 @@
                     <a:lstStyle/>
                     <a:p>
                       <a:r>
-                        <a:rPr lang="ru-RU" dirty="0" smtClean="0"/>
+                        <a:rPr lang="ru-RU" sz="1600" dirty="0" smtClean="0"/>
                         <a:t>94</a:t>
                       </a:r>
+                      <a:endParaRPr lang="ru-RU" sz="1600" dirty="0"/>
+                    </a:p>
+                  </a:txBody>
+                  <a:tcPr/>
+                </a:tc>
+              </a:tr>
+              <a:tr h="430754">
+                <a:tc>
+                  <a:txBody>
+                    <a:bodyPr/>
+                    <a:lstStyle/>
+                    <a:p>
+                      <a:r>
+                        <a:rPr lang="en-US" sz="1600" b="0" i="0" kern="1200" dirty="0" smtClean="0">
+                          <a:solidFill>
+                            <a:schemeClr val="dk1"/>
+                          </a:solidFill>
+                          <a:effectLst/>
+                          <a:latin typeface="+mn-lt"/>
+                          <a:ea typeface="+mn-ea"/>
+                          <a:cs typeface="+mn-cs"/>
+                        </a:rPr>
+                        <a:t>The Open Group Base Specifications</a:t>
+                      </a:r>
+                      <a:r>
+                        <a:rPr lang="en-US" sz="1600" b="0" i="0" kern="1200" baseline="0" dirty="0" smtClean="0">
+                          <a:solidFill>
+                            <a:schemeClr val="dk1"/>
+                          </a:solidFill>
+                          <a:effectLst/>
+                          <a:latin typeface="+mn-lt"/>
+                          <a:ea typeface="+mn-ea"/>
+                          <a:cs typeface="+mn-cs"/>
+                        </a:rPr>
+                        <a:t> </a:t>
+                      </a:r>
+                      <a:r>
+                        <a:rPr lang="en-US" sz="1600" b="0" i="0" kern="1200" dirty="0" smtClean="0">
+                          <a:solidFill>
+                            <a:schemeClr val="dk1"/>
+                          </a:solidFill>
+                          <a:effectLst/>
+                          <a:latin typeface="+mn-lt"/>
+                          <a:ea typeface="+mn-ea"/>
+                          <a:cs typeface="+mn-cs"/>
+                        </a:rPr>
+                        <a:t>IEEE </a:t>
+                      </a:r>
+                      <a:r>
+                        <a:rPr lang="en-US" sz="1600" b="0" i="0" kern="1200" dirty="0" err="1" smtClean="0">
+                          <a:solidFill>
+                            <a:schemeClr val="dk1"/>
+                          </a:solidFill>
+                          <a:effectLst/>
+                          <a:latin typeface="+mn-lt"/>
+                          <a:ea typeface="+mn-ea"/>
+                          <a:cs typeface="+mn-cs"/>
+                        </a:rPr>
+                        <a:t>Std</a:t>
+                      </a:r>
+                      <a:r>
+                        <a:rPr lang="en-US" sz="1600" b="0" i="0" kern="1200" dirty="0" smtClean="0">
+                          <a:solidFill>
+                            <a:schemeClr val="dk1"/>
+                          </a:solidFill>
+                          <a:effectLst/>
+                          <a:latin typeface="+mn-lt"/>
+                          <a:ea typeface="+mn-ea"/>
+                          <a:cs typeface="+mn-cs"/>
+                        </a:rPr>
+                        <a:t> 1003.1, </a:t>
+                      </a:r>
+                      <a:r>
+                        <a:rPr lang="en-US" sz="1600" b="0" i="0" kern="1200" dirty="0" err="1" smtClean="0">
+                          <a:solidFill>
+                            <a:schemeClr val="dk1"/>
+                          </a:solidFill>
+                          <a:effectLst/>
+                          <a:latin typeface="+mn-lt"/>
+                          <a:ea typeface="+mn-ea"/>
+                          <a:cs typeface="+mn-cs"/>
+                        </a:rPr>
+                        <a:t>fprintf</a:t>
+                      </a:r>
+                      <a:endParaRPr lang="ru-RU" sz="1600" dirty="0"/>
+                    </a:p>
+                  </a:txBody>
+                  <a:tcPr/>
+                </a:tc>
+                <a:tc>
+                  <a:txBody>
+                    <a:bodyPr/>
+                    <a:lstStyle/>
+                    <a:p>
+                      <a:r>
+                        <a:rPr lang="en-US" sz="1600" dirty="0" smtClean="0"/>
+                        <a:t>Issue</a:t>
+                      </a:r>
+                      <a:r>
+                        <a:rPr lang="en-US" sz="1600" baseline="0" dirty="0" smtClean="0"/>
+                        <a:t> 6, 2004 – Issue 7, 2008</a:t>
+                      </a:r>
+                      <a:endParaRPr lang="ru-RU" sz="1600" dirty="0"/>
+                    </a:p>
+                  </a:txBody>
+                  <a:tcPr/>
+                </a:tc>
+                <a:tc>
+                  <a:txBody>
+                    <a:bodyPr/>
+                    <a:lstStyle/>
+                    <a:p>
+                      <a:r>
+                        <a:rPr lang="en-US" sz="1600" dirty="0" smtClean="0"/>
+                        <a:t>32</a:t>
+                      </a:r>
+                      <a:endParaRPr lang="ru-RU" sz="1600" dirty="0"/>
+                    </a:p>
+                  </a:txBody>
+                  <a:tcPr/>
+                </a:tc>
+                <a:tc>
+                  <a:txBody>
+                    <a:bodyPr/>
+                    <a:lstStyle/>
+                    <a:p>
+                      <a:r>
+                        <a:rPr lang="en-US" sz="1600" dirty="0" smtClean="0"/>
+                        <a:t>104/123</a:t>
+                      </a:r>
+                      <a:endParaRPr lang="ru-RU" sz="1600" dirty="0"/>
+                    </a:p>
+                  </a:txBody>
+                  <a:tcPr/>
+                </a:tc>
+                <a:tc>
+                  <a:txBody>
+                    <a:bodyPr/>
+                    <a:lstStyle/>
+                    <a:p>
+                      <a:r>
+                        <a:rPr lang="en-US" sz="1600" dirty="0" smtClean="0"/>
+                        <a:t>84</a:t>
+                      </a:r>
                       <a:endParaRPr lang="ru-RU" dirty="0"/>
+                    </a:p>
+                  </a:txBody>
+                  <a:tcPr/>
+                </a:tc>
+              </a:tr>
+              <a:tr h="558385">
+                <a:tc>
+                  <a:txBody>
+                    <a:bodyPr/>
+                    <a:lstStyle/>
+                    <a:p>
+                      <a:pPr marL="0" marR="0" indent="0" algn="l" defTabSz="914400" rtl="0" eaLnBrk="1" fontAlgn="auto" latinLnBrk="0" hangingPunct="1">
+                        <a:lnSpc>
+                          <a:spcPct val="100000"/>
+                        </a:lnSpc>
+                        <a:spcBef>
+                          <a:spcPts val="0"/>
+                        </a:spcBef>
+                        <a:spcAft>
+                          <a:spcPts val="0"/>
+                        </a:spcAft>
+                        <a:buClrTx/>
+                        <a:buSzTx/>
+                        <a:buFontTx/>
+                        <a:buNone/>
+                        <a:tabLst/>
+                        <a:defRPr/>
+                      </a:pPr>
+                      <a:r>
+                        <a:rPr lang="en-US" sz="1600" b="0" i="0" kern="1200" dirty="0" smtClean="0">
+                          <a:solidFill>
+                            <a:schemeClr val="dk1"/>
+                          </a:solidFill>
+                          <a:effectLst/>
+                          <a:latin typeface="+mn-lt"/>
+                          <a:ea typeface="+mn-ea"/>
+                          <a:cs typeface="+mn-cs"/>
+                        </a:rPr>
+                        <a:t>The Open Group Base Specifications</a:t>
+                      </a:r>
+                      <a:r>
+                        <a:rPr lang="en-US" sz="1600" b="0" i="0" kern="1200" baseline="0" dirty="0" smtClean="0">
+                          <a:solidFill>
+                            <a:schemeClr val="dk1"/>
+                          </a:solidFill>
+                          <a:effectLst/>
+                          <a:latin typeface="+mn-lt"/>
+                          <a:ea typeface="+mn-ea"/>
+                          <a:cs typeface="+mn-cs"/>
+                        </a:rPr>
+                        <a:t> </a:t>
+                      </a:r>
+                      <a:r>
+                        <a:rPr lang="en-US" sz="1600" b="0" i="0" kern="1200" dirty="0" smtClean="0">
+                          <a:solidFill>
+                            <a:schemeClr val="dk1"/>
+                          </a:solidFill>
+                          <a:effectLst/>
+                          <a:latin typeface="+mn-lt"/>
+                          <a:ea typeface="+mn-ea"/>
+                          <a:cs typeface="+mn-cs"/>
+                        </a:rPr>
+                        <a:t>IEEE </a:t>
+                      </a:r>
+                      <a:r>
+                        <a:rPr lang="en-US" sz="1600" b="0" i="0" kern="1200" dirty="0" err="1" smtClean="0">
+                          <a:solidFill>
+                            <a:schemeClr val="dk1"/>
+                          </a:solidFill>
+                          <a:effectLst/>
+                          <a:latin typeface="+mn-lt"/>
+                          <a:ea typeface="+mn-ea"/>
+                          <a:cs typeface="+mn-cs"/>
+                        </a:rPr>
+                        <a:t>Std</a:t>
+                      </a:r>
+                      <a:r>
+                        <a:rPr lang="en-US" sz="1600" b="0" i="0" kern="1200" dirty="0" smtClean="0">
+                          <a:solidFill>
+                            <a:schemeClr val="dk1"/>
+                          </a:solidFill>
+                          <a:effectLst/>
+                          <a:latin typeface="+mn-lt"/>
+                          <a:ea typeface="+mn-ea"/>
+                          <a:cs typeface="+mn-cs"/>
+                        </a:rPr>
+                        <a:t> 1003.1, </a:t>
+                      </a:r>
+                      <a:r>
+                        <a:rPr lang="en-US" sz="1600" b="0" i="0" kern="1200" dirty="0" err="1" smtClean="0">
+                          <a:solidFill>
+                            <a:schemeClr val="dk1"/>
+                          </a:solidFill>
+                          <a:effectLst/>
+                          <a:latin typeface="+mn-lt"/>
+                          <a:ea typeface="+mn-ea"/>
+                          <a:cs typeface="+mn-cs"/>
+                        </a:rPr>
+                        <a:t>fwprintf</a:t>
+                      </a:r>
+                      <a:endParaRPr lang="ru-RU" sz="1600" dirty="0" smtClean="0"/>
+                    </a:p>
+                  </a:txBody>
+                  <a:tcPr/>
+                </a:tc>
+                <a:tc>
+                  <a:txBody>
+                    <a:bodyPr/>
+                    <a:lstStyle/>
+                    <a:p>
+                      <a:pPr marL="0" marR="0" indent="0" algn="l" defTabSz="914400" rtl="0" eaLnBrk="1" fontAlgn="auto" latinLnBrk="0" hangingPunct="1">
+                        <a:lnSpc>
+                          <a:spcPct val="100000"/>
+                        </a:lnSpc>
+                        <a:spcBef>
+                          <a:spcPts val="0"/>
+                        </a:spcBef>
+                        <a:spcAft>
+                          <a:spcPts val="0"/>
+                        </a:spcAft>
+                        <a:buClrTx/>
+                        <a:buSzTx/>
+                        <a:buFontTx/>
+                        <a:buNone/>
+                        <a:tabLst/>
+                        <a:defRPr/>
+                      </a:pPr>
+                      <a:r>
+                        <a:rPr lang="en-US" sz="1600" dirty="0" smtClean="0"/>
+                        <a:t>Issue</a:t>
+                      </a:r>
+                      <a:r>
+                        <a:rPr lang="en-US" sz="1600" baseline="0" dirty="0" smtClean="0"/>
+                        <a:t> 6, 2004 – Issue 7, 2008</a:t>
+                      </a:r>
+                      <a:endParaRPr lang="ru-RU" sz="1600" dirty="0" smtClean="0"/>
+                    </a:p>
+                  </a:txBody>
+                  <a:tcPr/>
+                </a:tc>
+                <a:tc>
+                  <a:txBody>
+                    <a:bodyPr/>
+                    <a:lstStyle/>
+                    <a:p>
+                      <a:r>
+                        <a:rPr lang="en-US" sz="1600" dirty="0" smtClean="0"/>
+                        <a:t>23</a:t>
+                      </a:r>
+                      <a:endParaRPr lang="ru-RU" sz="1600" dirty="0"/>
+                    </a:p>
+                  </a:txBody>
+                  <a:tcPr/>
+                </a:tc>
+                <a:tc>
+                  <a:txBody>
+                    <a:bodyPr/>
+                    <a:lstStyle/>
+                    <a:p>
+                      <a:r>
+                        <a:rPr lang="en-US" sz="1600" dirty="0" smtClean="0"/>
+                        <a:t>93/111</a:t>
+                      </a:r>
+                      <a:endParaRPr lang="ru-RU" sz="1600" dirty="0"/>
+                    </a:p>
+                  </a:txBody>
+                  <a:tcPr/>
+                </a:tc>
+                <a:tc>
+                  <a:txBody>
+                    <a:bodyPr/>
+                    <a:lstStyle/>
+                    <a:p>
+                      <a:r>
+                        <a:rPr lang="en-US" sz="1600" dirty="0" smtClean="0"/>
+                        <a:t>83</a:t>
+                      </a:r>
+                      <a:endParaRPr lang="ru-RU" sz="1600" dirty="0"/>
+                    </a:p>
+                  </a:txBody>
+                  <a:tcPr/>
+                </a:tc>
+              </a:tr>
+              <a:tr h="558385">
+                <a:tc>
+                  <a:txBody>
+                    <a:bodyPr/>
+                    <a:lstStyle/>
+                    <a:p>
+                      <a:pPr marL="0" marR="0" indent="0" algn="l" defTabSz="914400" rtl="0" eaLnBrk="1" fontAlgn="auto" latinLnBrk="0" hangingPunct="1">
+                        <a:lnSpc>
+                          <a:spcPct val="100000"/>
+                        </a:lnSpc>
+                        <a:spcBef>
+                          <a:spcPts val="0"/>
+                        </a:spcBef>
+                        <a:spcAft>
+                          <a:spcPts val="0"/>
+                        </a:spcAft>
+                        <a:buClrTx/>
+                        <a:buSzTx/>
+                        <a:buFontTx/>
+                        <a:buNone/>
+                        <a:tabLst/>
+                        <a:defRPr/>
+                      </a:pPr>
+                      <a:r>
+                        <a:rPr lang="en-US" sz="1600" b="0" i="0" kern="1200" dirty="0" smtClean="0">
+                          <a:solidFill>
+                            <a:schemeClr val="dk1"/>
+                          </a:solidFill>
+                          <a:effectLst/>
+                          <a:latin typeface="+mn-lt"/>
+                          <a:ea typeface="+mn-ea"/>
+                          <a:cs typeface="+mn-cs"/>
+                        </a:rPr>
+                        <a:t>The Open Group Base Specifications</a:t>
+                      </a:r>
+                      <a:r>
+                        <a:rPr lang="en-US" sz="1600" b="0" i="0" kern="1200" baseline="0" dirty="0" smtClean="0">
+                          <a:solidFill>
+                            <a:schemeClr val="dk1"/>
+                          </a:solidFill>
+                          <a:effectLst/>
+                          <a:latin typeface="+mn-lt"/>
+                          <a:ea typeface="+mn-ea"/>
+                          <a:cs typeface="+mn-cs"/>
+                        </a:rPr>
+                        <a:t> </a:t>
+                      </a:r>
+                      <a:r>
+                        <a:rPr lang="en-US" sz="1600" b="0" i="0" kern="1200" dirty="0" smtClean="0">
+                          <a:solidFill>
+                            <a:schemeClr val="dk1"/>
+                          </a:solidFill>
+                          <a:effectLst/>
+                          <a:latin typeface="+mn-lt"/>
+                          <a:ea typeface="+mn-ea"/>
+                          <a:cs typeface="+mn-cs"/>
+                        </a:rPr>
+                        <a:t>IEEE </a:t>
+                      </a:r>
+                      <a:r>
+                        <a:rPr lang="en-US" sz="1600" b="0" i="0" kern="1200" dirty="0" err="1" smtClean="0">
+                          <a:solidFill>
+                            <a:schemeClr val="dk1"/>
+                          </a:solidFill>
+                          <a:effectLst/>
+                          <a:latin typeface="+mn-lt"/>
+                          <a:ea typeface="+mn-ea"/>
+                          <a:cs typeface="+mn-cs"/>
+                        </a:rPr>
+                        <a:t>Std</a:t>
+                      </a:r>
+                      <a:r>
+                        <a:rPr lang="en-US" sz="1600" b="0" i="0" kern="1200" dirty="0" smtClean="0">
+                          <a:solidFill>
+                            <a:schemeClr val="dk1"/>
+                          </a:solidFill>
+                          <a:effectLst/>
+                          <a:latin typeface="+mn-lt"/>
+                          <a:ea typeface="+mn-ea"/>
+                          <a:cs typeface="+mn-cs"/>
+                        </a:rPr>
+                        <a:t> 1003.1, environ(exec)</a:t>
+                      </a:r>
+                      <a:endParaRPr lang="ru-RU" sz="1600" dirty="0" smtClean="0"/>
+                    </a:p>
+                  </a:txBody>
+                  <a:tcPr/>
+                </a:tc>
+                <a:tc>
+                  <a:txBody>
+                    <a:bodyPr/>
+                    <a:lstStyle/>
+                    <a:p>
+                      <a:pPr marL="0" marR="0" indent="0" algn="l" defTabSz="914400" rtl="0" eaLnBrk="1" fontAlgn="auto" latinLnBrk="0" hangingPunct="1">
+                        <a:lnSpc>
+                          <a:spcPct val="100000"/>
+                        </a:lnSpc>
+                        <a:spcBef>
+                          <a:spcPts val="0"/>
+                        </a:spcBef>
+                        <a:spcAft>
+                          <a:spcPts val="0"/>
+                        </a:spcAft>
+                        <a:buClrTx/>
+                        <a:buSzTx/>
+                        <a:buFontTx/>
+                        <a:buNone/>
+                        <a:tabLst/>
+                        <a:defRPr/>
+                      </a:pPr>
+                      <a:r>
+                        <a:rPr lang="en-US" sz="1600" dirty="0" smtClean="0"/>
+                        <a:t>Issue</a:t>
+                      </a:r>
+                      <a:r>
+                        <a:rPr lang="en-US" sz="1600" baseline="0" dirty="0" smtClean="0"/>
+                        <a:t> 6, 2004 – Issue 7, 2008</a:t>
+                      </a:r>
+                      <a:endParaRPr lang="ru-RU" sz="1600" dirty="0" smtClean="0"/>
+                    </a:p>
+                  </a:txBody>
+                  <a:tcPr/>
+                </a:tc>
+                <a:tc>
+                  <a:txBody>
+                    <a:bodyPr/>
+                    <a:lstStyle/>
+                    <a:p>
+                      <a:r>
+                        <a:rPr lang="ru-RU" sz="1600" dirty="0" smtClean="0"/>
+                        <a:t>33</a:t>
+                      </a:r>
+                      <a:endParaRPr lang="ru-RU" sz="1600" dirty="0"/>
+                    </a:p>
+                  </a:txBody>
+                  <a:tcPr/>
+                </a:tc>
+                <a:tc>
+                  <a:txBody>
+                    <a:bodyPr/>
+                    <a:lstStyle/>
+                    <a:p>
+                      <a:r>
+                        <a:rPr lang="en-US" sz="1600" dirty="0" smtClean="0"/>
+                        <a:t>83/112</a:t>
+                      </a:r>
+                      <a:endParaRPr lang="ru-RU" sz="1600" dirty="0"/>
+                    </a:p>
+                  </a:txBody>
+                  <a:tcPr/>
+                </a:tc>
+                <a:tc>
+                  <a:txBody>
+                    <a:bodyPr/>
+                    <a:lstStyle/>
+                    <a:p>
+                      <a:r>
+                        <a:rPr lang="en-US" sz="1600" dirty="0" smtClean="0"/>
+                        <a:t>74</a:t>
+                      </a:r>
+                      <a:endParaRPr lang="ru-RU" sz="1600" dirty="0"/>
+                    </a:p>
+                  </a:txBody>
+                  <a:tcPr/>
+                </a:tc>
+              </a:tr>
+              <a:tr h="558385">
+                <a:tc>
+                  <a:txBody>
+                    <a:bodyPr/>
+                    <a:lstStyle/>
+                    <a:p>
+                      <a:pPr marL="0" marR="0" indent="0" algn="l" defTabSz="914400" rtl="0" eaLnBrk="1" fontAlgn="auto" latinLnBrk="0" hangingPunct="1">
+                        <a:lnSpc>
+                          <a:spcPct val="100000"/>
+                        </a:lnSpc>
+                        <a:spcBef>
+                          <a:spcPts val="0"/>
+                        </a:spcBef>
+                        <a:spcAft>
+                          <a:spcPts val="0"/>
+                        </a:spcAft>
+                        <a:buClrTx/>
+                        <a:buSzTx/>
+                        <a:buFontTx/>
+                        <a:buNone/>
+                        <a:tabLst/>
+                        <a:defRPr/>
+                      </a:pPr>
+                      <a:r>
+                        <a:rPr lang="en-US" sz="1600" dirty="0" smtClean="0"/>
+                        <a:t>IEEE POSIX (all,</a:t>
+                      </a:r>
+                      <a:r>
+                        <a:rPr lang="en-US" sz="1600" baseline="0" dirty="0" smtClean="0"/>
+                        <a:t> rough)</a:t>
+                      </a:r>
+                      <a:endParaRPr lang="ru-RU" sz="1600" dirty="0" smtClean="0"/>
+                    </a:p>
+                  </a:txBody>
+                  <a:tcPr/>
+                </a:tc>
+                <a:tc>
+                  <a:txBody>
+                    <a:bodyPr/>
+                    <a:lstStyle/>
+                    <a:p>
+                      <a:pPr marL="0" marR="0" indent="0" algn="l" defTabSz="914400" rtl="0" eaLnBrk="1" fontAlgn="auto" latinLnBrk="0" hangingPunct="1">
+                        <a:lnSpc>
+                          <a:spcPct val="100000"/>
+                        </a:lnSpc>
+                        <a:spcBef>
+                          <a:spcPts val="0"/>
+                        </a:spcBef>
+                        <a:spcAft>
+                          <a:spcPts val="0"/>
+                        </a:spcAft>
+                        <a:buClrTx/>
+                        <a:buSzTx/>
+                        <a:buFontTx/>
+                        <a:buNone/>
+                        <a:tabLst/>
+                        <a:defRPr/>
+                      </a:pPr>
+                      <a:r>
+                        <a:rPr lang="en-US" sz="1600" dirty="0" smtClean="0"/>
+                        <a:t>Issue</a:t>
+                      </a:r>
+                      <a:r>
+                        <a:rPr lang="en-US" sz="1600" baseline="0" dirty="0" smtClean="0"/>
+                        <a:t> 6, 2004 – Issue 7, 2008</a:t>
+                      </a:r>
+                      <a:endParaRPr lang="ru-RU" sz="1600" dirty="0" smtClean="0"/>
+                    </a:p>
+                  </a:txBody>
+                  <a:tcPr/>
+                </a:tc>
+                <a:tc>
+                  <a:txBody>
+                    <a:bodyPr/>
+                    <a:lstStyle/>
+                    <a:p>
+                      <a:r>
+                        <a:rPr lang="en-US" sz="1600" dirty="0" smtClean="0"/>
+                        <a:t>??</a:t>
+                      </a:r>
+                      <a:endParaRPr lang="ru-RU" sz="1600" dirty="0"/>
+                    </a:p>
+                  </a:txBody>
+                  <a:tcPr/>
+                </a:tc>
+                <a:tc>
+                  <a:txBody>
+                    <a:bodyPr/>
+                    <a:lstStyle/>
+                    <a:p>
+                      <a:r>
+                        <a:rPr lang="ru-RU" sz="1600" kern="1200" dirty="0" smtClean="0">
+                          <a:solidFill>
+                            <a:schemeClr val="dk1"/>
+                          </a:solidFill>
+                          <a:latin typeface="+mn-lt"/>
+                          <a:ea typeface="+mn-ea"/>
+                          <a:cs typeface="+mn-cs"/>
+                        </a:rPr>
+                        <a:t>8828</a:t>
+                      </a:r>
+                      <a:r>
+                        <a:rPr lang="en-US" sz="1600" kern="1200" dirty="0" smtClean="0">
+                          <a:solidFill>
+                            <a:schemeClr val="dk1"/>
+                          </a:solidFill>
+                          <a:latin typeface="+mn-lt"/>
+                          <a:ea typeface="+mn-ea"/>
+                          <a:cs typeface="+mn-cs"/>
+                        </a:rPr>
+                        <a:t>/</a:t>
+                      </a:r>
+                      <a:r>
+                        <a:rPr lang="ru-RU" sz="1600" kern="1200" dirty="0" smtClean="0">
+                          <a:solidFill>
+                            <a:schemeClr val="dk1"/>
+                          </a:solidFill>
+                          <a:latin typeface="+mn-lt"/>
+                          <a:ea typeface="+mn-ea"/>
+                          <a:cs typeface="+mn-cs"/>
+                        </a:rPr>
+                        <a:t>11011</a:t>
+                      </a:r>
+                      <a:endParaRPr lang="ru-RU" sz="1600" dirty="0"/>
+                    </a:p>
+                  </a:txBody>
+                  <a:tcPr/>
+                </a:tc>
+                <a:tc>
+                  <a:txBody>
+                    <a:bodyPr/>
+                    <a:lstStyle/>
+                    <a:p>
+                      <a:r>
+                        <a:rPr lang="en-US" sz="1600" dirty="0" smtClean="0"/>
+                        <a:t>80</a:t>
+                      </a:r>
+                      <a:endParaRPr lang="ru-RU" sz="1600" dirty="0"/>
                     </a:p>
                   </a:txBody>
                   <a:tcPr/>
@@ -5223,7 +5847,12 @@
             <p:ph type="sldNum" sz="quarter" idx="12"/>
           </p:nvPr>
         </p:nvSpPr>
-        <p:spPr/>
+        <p:spPr>
+          <a:xfrm>
+            <a:off x="6732240" y="6309320"/>
+            <a:ext cx="2133600" cy="365125"/>
+          </a:xfrm>
+        </p:spPr>
         <p:txBody>
           <a:bodyPr/>
           <a:lstStyle/>

</xml_diff>